<commit_message>
Added notes to some slides
</commit_message>
<xml_diff>
--- a/1. Install server with GUI/Documents/Presentation.pptx
+++ b/1. Install server with GUI/Documents/Presentation.pptx
@@ -254,7 +254,7 @@
           <a:p>
             <a:fld id="{FF078CFF-F1FC-4E8D-9C0D-9FCFCF239370}" type="datetimeFigureOut">
               <a:rPr lang="en-US" smtClean="0"/>
-              <a:t>3/26/2019</a:t>
+              <a:t>4/8/2019</a:t>
             </a:fld>
             <a:endParaRPr lang="en-US"/>
           </a:p>
@@ -568,13 +568,7 @@
           <a:p>
             <a:r>
               <a:rPr lang="en-US" dirty="0" smtClean="0"/>
-              <a:t>This happens when you try to install a VM that has 512 Minimum RAM and startup RAM.</a:t>
-            </a:r>
-          </a:p>
-          <a:p>
-            <a:r>
-              <a:rPr lang="en-US" dirty="0" smtClean="0"/>
-              <a:t>To solve the issue just give the machine 1024 MB startup RAM; you can keep the 512 minimum RAM if you want.</a:t>
+              <a:t>While Windows Server 2019 could run on 512 MB, you need at least 1 GB of RAM for the installation phase.</a:t>
             </a:r>
             <a:endParaRPr lang="en-US" dirty="0"/>
           </a:p>
@@ -597,7 +591,7 @@
           <a:p>
             <a:fld id="{D7549FFE-5A44-40D1-8EEA-4FC61FBFF1FE}" type="slidenum">
               <a:rPr lang="en-US" smtClean="0"/>
-              <a:t>4</a:t>
+              <a:t>3</a:t>
             </a:fld>
             <a:endParaRPr lang="en-US"/>
           </a:p>
@@ -606,7 +600,123 @@
     </p:spTree>
     <p:extLst>
       <p:ext uri="{BB962C8B-B14F-4D97-AF65-F5344CB8AC3E}">
-        <p14:creationId xmlns:p14="http://schemas.microsoft.com/office/powerpoint/2010/main" val="1735173360"/>
+        <p14:creationId xmlns:p14="http://schemas.microsoft.com/office/powerpoint/2010/main" val="3855204114"/>
+      </p:ext>
+    </p:extLst>
+  </p:cSld>
+  <p:clrMapOvr>
+    <a:masterClrMapping/>
+  </p:clrMapOvr>
+</p:notes>
+</file>
+
+<file path=ppt/notesSlides/notesSlide10.xml><?xml version="1.0" encoding="utf-8"?>
+<p:notes xmlns:a="http://schemas.openxmlformats.org/drawingml/2006/main" xmlns:r="http://schemas.openxmlformats.org/officeDocument/2006/relationships" xmlns:p="http://schemas.openxmlformats.org/presentationml/2006/main">
+  <p:cSld>
+    <p:spTree>
+      <p:nvGrpSpPr>
+        <p:cNvPr id="1" name=""/>
+        <p:cNvGrpSpPr/>
+        <p:nvPr/>
+      </p:nvGrpSpPr>
+      <p:grpSpPr>
+        <a:xfrm>
+          <a:off x="0" y="0"/>
+          <a:ext cx="0" cy="0"/>
+          <a:chOff x="0" y="0"/>
+          <a:chExt cx="0" cy="0"/>
+        </a:xfrm>
+      </p:grpSpPr>
+      <p:sp>
+        <p:nvSpPr>
+          <p:cNvPr id="2" name="Slide Image Placeholder 1"/>
+          <p:cNvSpPr>
+            <a:spLocks noGrp="1" noRot="1" noChangeAspect="1"/>
+          </p:cNvSpPr>
+          <p:nvPr>
+            <p:ph type="sldImg"/>
+          </p:nvPr>
+        </p:nvSpPr>
+        <p:spPr/>
+      </p:sp>
+      <p:sp>
+        <p:nvSpPr>
+          <p:cNvPr id="3" name="Notes Placeholder 2"/>
+          <p:cNvSpPr>
+            <a:spLocks noGrp="1"/>
+          </p:cNvSpPr>
+          <p:nvPr>
+            <p:ph type="body" idx="1"/>
+          </p:nvPr>
+        </p:nvSpPr>
+        <p:spPr/>
+        <p:txBody>
+          <a:bodyPr/>
+          <a:lstStyle/>
+          <a:p>
+            <a:r>
+              <a:rPr lang="en-US" dirty="0" smtClean="0"/>
+              <a:t>You</a:t>
+            </a:r>
+            <a:r>
+              <a:rPr lang="en-US" baseline="0" dirty="0" smtClean="0"/>
+              <a:t> have to set a password for the local Administrator user. Because of the Local Security Policy you have to use 3 of the 4 character types:</a:t>
+            </a:r>
+          </a:p>
+          <a:p>
+            <a:r>
+              <a:rPr lang="en-US" baseline="0" dirty="0" smtClean="0"/>
+              <a:t>  - Uppercase letters</a:t>
+            </a:r>
+          </a:p>
+          <a:p>
+            <a:r>
+              <a:rPr lang="en-US" baseline="0" dirty="0" smtClean="0"/>
+              <a:t>  - Lowercase letters</a:t>
+            </a:r>
+          </a:p>
+          <a:p>
+            <a:r>
+              <a:rPr lang="en-US" baseline="0" dirty="0" smtClean="0"/>
+              <a:t>  - Numbers</a:t>
+            </a:r>
+          </a:p>
+          <a:p>
+            <a:r>
+              <a:rPr lang="en-US" baseline="0" dirty="0" smtClean="0"/>
+              <a:t>  - Special characters</a:t>
+            </a:r>
+            <a:endParaRPr lang="en-US" dirty="0"/>
+          </a:p>
+        </p:txBody>
+      </p:sp>
+      <p:sp>
+        <p:nvSpPr>
+          <p:cNvPr id="4" name="Slide Number Placeholder 3"/>
+          <p:cNvSpPr>
+            <a:spLocks noGrp="1"/>
+          </p:cNvSpPr>
+          <p:nvPr>
+            <p:ph type="sldNum" sz="quarter" idx="10"/>
+          </p:nvPr>
+        </p:nvSpPr>
+        <p:spPr/>
+        <p:txBody>
+          <a:bodyPr/>
+          <a:lstStyle/>
+          <a:p>
+            <a:fld id="{D7549FFE-5A44-40D1-8EEA-4FC61FBFF1FE}" type="slidenum">
+              <a:rPr lang="en-US" smtClean="0"/>
+              <a:t>16</a:t>
+            </a:fld>
+            <a:endParaRPr lang="en-US"/>
+          </a:p>
+        </p:txBody>
+      </p:sp>
+    </p:spTree>
+    <p:extLst>
+      <p:ext uri="{BB962C8B-B14F-4D97-AF65-F5344CB8AC3E}">
+        <p14:creationId xmlns:p14="http://schemas.microsoft.com/office/powerpoint/2010/main" val="2220607411"/>
       </p:ext>
     </p:extLst>
   </p:cSld>
@@ -662,17 +772,13 @@
           <a:p>
             <a:r>
               <a:rPr lang="en-US" dirty="0" smtClean="0"/>
-              <a:t>You can select the OS language to be used. If the ISO is the</a:t>
-            </a:r>
-            <a:r>
-              <a:rPr lang="en-US" baseline="0" dirty="0" smtClean="0"/>
-              <a:t> English version only this language is selectable</a:t>
-            </a:r>
-          </a:p>
-          <a:p>
-            <a:r>
-              <a:rPr lang="en-US" baseline="0" dirty="0" smtClean="0"/>
-              <a:t>Time and currency format and keyboard layout can be selected  based on your region. I recommend sticking to English US for both</a:t>
+              <a:t>This happens when you try to install a VM that has 512 Minimum RAM and startup RAM.</a:t>
+            </a:r>
+          </a:p>
+          <a:p>
+            <a:r>
+              <a:rPr lang="en-US" dirty="0" smtClean="0"/>
+              <a:t>To solve the issue just give the machine 1024 MB startup RAM; you can keep the 512 minimum RAM if you want.</a:t>
             </a:r>
             <a:endParaRPr lang="en-US" dirty="0"/>
           </a:p>
@@ -695,7 +801,7 @@
           <a:p>
             <a:fld id="{D7549FFE-5A44-40D1-8EEA-4FC61FBFF1FE}" type="slidenum">
               <a:rPr lang="en-US" smtClean="0"/>
-              <a:t>9</a:t>
+              <a:t>4</a:t>
             </a:fld>
             <a:endParaRPr lang="en-US"/>
           </a:p>
@@ -704,7 +810,7 @@
     </p:spTree>
     <p:extLst>
       <p:ext uri="{BB962C8B-B14F-4D97-AF65-F5344CB8AC3E}">
-        <p14:creationId xmlns:p14="http://schemas.microsoft.com/office/powerpoint/2010/main" val="3481966513"/>
+        <p14:creationId xmlns:p14="http://schemas.microsoft.com/office/powerpoint/2010/main" val="1735173360"/>
       </p:ext>
     </p:extLst>
   </p:cSld>
@@ -760,7 +866,17 @@
           <a:p>
             <a:r>
               <a:rPr lang="en-US" dirty="0" smtClean="0"/>
-              <a:t>Besides installing Windows, you also have some repair and recovery tools on the installation media</a:t>
+              <a:t>You can select the OS language to be used. If the ISO is the</a:t>
+            </a:r>
+            <a:r>
+              <a:rPr lang="en-US" baseline="0" dirty="0" smtClean="0"/>
+              <a:t> English version only this language is selectable</a:t>
+            </a:r>
+          </a:p>
+          <a:p>
+            <a:r>
+              <a:rPr lang="en-US" baseline="0" dirty="0" smtClean="0"/>
+              <a:t>Time and currency format and keyboard layout can be selected  based on your region. I recommend sticking to English US for both</a:t>
             </a:r>
             <a:endParaRPr lang="en-US" dirty="0"/>
           </a:p>
@@ -783,7 +899,7 @@
           <a:p>
             <a:fld id="{D7549FFE-5A44-40D1-8EEA-4FC61FBFF1FE}" type="slidenum">
               <a:rPr lang="en-US" smtClean="0"/>
-              <a:t>10</a:t>
+              <a:t>9</a:t>
             </a:fld>
             <a:endParaRPr lang="en-US"/>
           </a:p>
@@ -792,7 +908,7 @@
     </p:spTree>
     <p:extLst>
       <p:ext uri="{BB962C8B-B14F-4D97-AF65-F5344CB8AC3E}">
-        <p14:creationId xmlns:p14="http://schemas.microsoft.com/office/powerpoint/2010/main" val="3399272794"/>
+        <p14:creationId xmlns:p14="http://schemas.microsoft.com/office/powerpoint/2010/main" val="3481966513"/>
       </p:ext>
     </p:extLst>
   </p:cSld>
@@ -848,20 +964,7 @@
           <a:p>
             <a:r>
               <a:rPr lang="en-US" dirty="0" smtClean="0"/>
-              <a:t>The 2 most used Windows Server</a:t>
-            </a:r>
-            <a:r>
-              <a:rPr lang="en-US" baseline="0" dirty="0" smtClean="0"/>
-              <a:t> editions are Standard and Datacenter but there are also others like Hyper-V Server, Windows Essentials, Windows Storage Server.</a:t>
-            </a:r>
-          </a:p>
-          <a:p>
-            <a:endParaRPr lang="en-US" baseline="0" dirty="0" smtClean="0"/>
-          </a:p>
-          <a:p>
-            <a:r>
-              <a:rPr lang="en-US" baseline="0" dirty="0" smtClean="0"/>
-              <a:t>Besides the 2 editions available on the disc, you can also choose if your server will have a graphical user interface or not.</a:t>
+              <a:t>Besides installing Windows, you also have some repair and recovery tools on the installation media</a:t>
             </a:r>
             <a:endParaRPr lang="en-US" dirty="0"/>
           </a:p>
@@ -884,7 +987,7 @@
           <a:p>
             <a:fld id="{D7549FFE-5A44-40D1-8EEA-4FC61FBFF1FE}" type="slidenum">
               <a:rPr lang="en-US" smtClean="0"/>
-              <a:t>11</a:t>
+              <a:t>10</a:t>
             </a:fld>
             <a:endParaRPr lang="en-US"/>
           </a:p>
@@ -893,7 +996,7 @@
     </p:spTree>
     <p:extLst>
       <p:ext uri="{BB962C8B-B14F-4D97-AF65-F5344CB8AC3E}">
-        <p14:creationId xmlns:p14="http://schemas.microsoft.com/office/powerpoint/2010/main" val="799775224"/>
+        <p14:creationId xmlns:p14="http://schemas.microsoft.com/office/powerpoint/2010/main" val="3399272794"/>
       </p:ext>
     </p:extLst>
   </p:cSld>
@@ -947,6 +1050,23 @@
           <a:bodyPr/>
           <a:lstStyle/>
           <a:p>
+            <a:r>
+              <a:rPr lang="en-US" dirty="0" smtClean="0"/>
+              <a:t>The 2 most used Windows Server</a:t>
+            </a:r>
+            <a:r>
+              <a:rPr lang="en-US" baseline="0" dirty="0" smtClean="0"/>
+              <a:t> editions are Standard and Datacenter but there are also others like Hyper-V Server, Windows Essentials, Windows Storage Server.</a:t>
+            </a:r>
+          </a:p>
+          <a:p>
+            <a:endParaRPr lang="en-US" baseline="0" dirty="0" smtClean="0"/>
+          </a:p>
+          <a:p>
+            <a:r>
+              <a:rPr lang="en-US" baseline="0" dirty="0" smtClean="0"/>
+              <a:t>Besides the 2 editions available on the disc, you can also choose if your server will have a graphical user interface or not.</a:t>
+            </a:r>
             <a:endParaRPr lang="en-US" dirty="0"/>
           </a:p>
         </p:txBody>
@@ -968,7 +1088,7 @@
           <a:p>
             <a:fld id="{D7549FFE-5A44-40D1-8EEA-4FC61FBFF1FE}" type="slidenum">
               <a:rPr lang="en-US" smtClean="0"/>
-              <a:t>12</a:t>
+              <a:t>11</a:t>
             </a:fld>
             <a:endParaRPr lang="en-US"/>
           </a:p>
@@ -977,7 +1097,7 @@
     </p:spTree>
     <p:extLst>
       <p:ext uri="{BB962C8B-B14F-4D97-AF65-F5344CB8AC3E}">
-        <p14:creationId xmlns:p14="http://schemas.microsoft.com/office/powerpoint/2010/main" val="2322942166"/>
+        <p14:creationId xmlns:p14="http://schemas.microsoft.com/office/powerpoint/2010/main" val="799775224"/>
       </p:ext>
     </p:extLst>
   </p:cSld>
@@ -1031,20 +1151,6 @@
           <a:bodyPr/>
           <a:lstStyle/>
           <a:p>
-            <a:r>
-              <a:rPr lang="en-US" dirty="0" smtClean="0"/>
-              <a:t>You have the option to perform a clean install: the selected HDD will</a:t>
-            </a:r>
-            <a:r>
-              <a:rPr lang="en-US" baseline="0" dirty="0" smtClean="0"/>
-              <a:t> be formatted, all data will be lost and you will get a fresh and clean install of Windows Server</a:t>
-            </a:r>
-          </a:p>
-          <a:p>
-            <a:r>
-              <a:rPr lang="en-US" baseline="0" dirty="0" smtClean="0"/>
-              <a:t>The other installation option is the upgrade from a previous version of Windows Server. The supported paths for upgrade are from 2012 R2 to 2019 and from 2016 to 2019</a:t>
-            </a:r>
             <a:endParaRPr lang="en-US" dirty="0"/>
           </a:p>
         </p:txBody>
@@ -1066,7 +1172,7 @@
           <a:p>
             <a:fld id="{D7549FFE-5A44-40D1-8EEA-4FC61FBFF1FE}" type="slidenum">
               <a:rPr lang="en-US" smtClean="0"/>
-              <a:t>13</a:t>
+              <a:t>12</a:t>
             </a:fld>
             <a:endParaRPr lang="en-US"/>
           </a:p>
@@ -1075,7 +1181,7 @@
     </p:spTree>
     <p:extLst>
       <p:ext uri="{BB962C8B-B14F-4D97-AF65-F5344CB8AC3E}">
-        <p14:creationId xmlns:p14="http://schemas.microsoft.com/office/powerpoint/2010/main" val="3087596077"/>
+        <p14:creationId xmlns:p14="http://schemas.microsoft.com/office/powerpoint/2010/main" val="2322942166"/>
       </p:ext>
     </p:extLst>
   </p:cSld>
@@ -1131,32 +1237,17 @@
           <a:p>
             <a:r>
               <a:rPr lang="en-US" dirty="0" smtClean="0"/>
-              <a:t>Here</a:t>
+              <a:t>You have the option to perform a clean install: the selected HDD will</a:t>
             </a:r>
             <a:r>
               <a:rPr lang="en-US" baseline="0" dirty="0" smtClean="0"/>
-              <a:t> you get to select the disk that the OS will be placed on. You can also create partitions if you want to.</a:t>
-            </a:r>
-          </a:p>
-          <a:p>
-            <a:endParaRPr lang="en-US" baseline="0" dirty="0" smtClean="0"/>
+              <a:t> be formatted, all data will be lost and you will get a fresh and clean install of Windows Server</a:t>
+            </a:r>
           </a:p>
           <a:p>
             <a:r>
               <a:rPr lang="en-US" baseline="0" dirty="0" smtClean="0"/>
-              <a:t>If installing on hardware and you do not see any disks there may be 2 possibilities for this:</a:t>
-            </a:r>
-          </a:p>
-          <a:p>
-            <a:r>
-              <a:rPr lang="en-US" baseline="0" dirty="0" smtClean="0"/>
-              <a:t>  - You need a storage drive in order to recognize the controller (use Load driver and after that Refresh)</a:t>
-            </a:r>
-          </a:p>
-          <a:p>
-            <a:r>
-              <a:rPr lang="en-US" baseline="0" dirty="0" smtClean="0"/>
-              <a:t>  - No volumes have been created on your RAID controller</a:t>
+              <a:t>The other installation option is the upgrade from a previous version of Windows Server. The supported paths for upgrade are from 2012 R2 to 2019 and from 2016 to 2019</a:t>
             </a:r>
             <a:endParaRPr lang="en-US" dirty="0"/>
           </a:p>
@@ -1179,7 +1270,7 @@
           <a:p>
             <a:fld id="{D7549FFE-5A44-40D1-8EEA-4FC61FBFF1FE}" type="slidenum">
               <a:rPr lang="en-US" smtClean="0"/>
-              <a:t>14</a:t>
+              <a:t>13</a:t>
             </a:fld>
             <a:endParaRPr lang="en-US"/>
           </a:p>
@@ -1188,7 +1279,7 @@
     </p:spTree>
     <p:extLst>
       <p:ext uri="{BB962C8B-B14F-4D97-AF65-F5344CB8AC3E}">
-        <p14:creationId xmlns:p14="http://schemas.microsoft.com/office/powerpoint/2010/main" val="1880744631"/>
+        <p14:creationId xmlns:p14="http://schemas.microsoft.com/office/powerpoint/2010/main" val="3087596077"/>
       </p:ext>
     </p:extLst>
   </p:cSld>
@@ -1244,11 +1335,32 @@
           <a:p>
             <a:r>
               <a:rPr lang="en-US" dirty="0" smtClean="0"/>
-              <a:t>Just</a:t>
+              <a:t>Here</a:t>
             </a:r>
             <a:r>
               <a:rPr lang="en-US" baseline="0" dirty="0" smtClean="0"/>
-              <a:t> sit back and let Windows Server install. After some restarts you will be prompted to change the local Administrator’s password</a:t>
+              <a:t> you get to select the disk that the OS will be placed on. You can also create partitions if you want to.</a:t>
+            </a:r>
+          </a:p>
+          <a:p>
+            <a:endParaRPr lang="en-US" baseline="0" dirty="0" smtClean="0"/>
+          </a:p>
+          <a:p>
+            <a:r>
+              <a:rPr lang="en-US" baseline="0" dirty="0" smtClean="0"/>
+              <a:t>If installing on hardware and you do not see any disks there may be 2 possibilities for this:</a:t>
+            </a:r>
+          </a:p>
+          <a:p>
+            <a:r>
+              <a:rPr lang="en-US" baseline="0" dirty="0" smtClean="0"/>
+              <a:t>  - You need a storage drive in order to recognize the controller (use Load driver and after that Refresh)</a:t>
+            </a:r>
+          </a:p>
+          <a:p>
+            <a:r>
+              <a:rPr lang="en-US" baseline="0" dirty="0" smtClean="0"/>
+              <a:t>  - No volumes have been created on your RAID controller</a:t>
             </a:r>
             <a:endParaRPr lang="en-US" dirty="0"/>
           </a:p>
@@ -1271,7 +1383,7 @@
           <a:p>
             <a:fld id="{D7549FFE-5A44-40D1-8EEA-4FC61FBFF1FE}" type="slidenum">
               <a:rPr lang="en-US" smtClean="0"/>
-              <a:t>15</a:t>
+              <a:t>14</a:t>
             </a:fld>
             <a:endParaRPr lang="en-US"/>
           </a:p>
@@ -1280,7 +1392,7 @@
     </p:spTree>
     <p:extLst>
       <p:ext uri="{BB962C8B-B14F-4D97-AF65-F5344CB8AC3E}">
-        <p14:creationId xmlns:p14="http://schemas.microsoft.com/office/powerpoint/2010/main" val="4182640726"/>
+        <p14:creationId xmlns:p14="http://schemas.microsoft.com/office/powerpoint/2010/main" val="1880744631"/>
       </p:ext>
     </p:extLst>
   </p:cSld>
@@ -1336,35 +1448,11 @@
           <a:p>
             <a:r>
               <a:rPr lang="en-US" dirty="0" smtClean="0"/>
-              <a:t>You</a:t>
+              <a:t>Just</a:t>
             </a:r>
             <a:r>
               <a:rPr lang="en-US" baseline="0" dirty="0" smtClean="0"/>
-              <a:t> have to set a password for the local Administrator user. Because of the Local Security Policy you have to use 3 of the 4 character types:</a:t>
-            </a:r>
-          </a:p>
-          <a:p>
-            <a:r>
-              <a:rPr lang="en-US" baseline="0" dirty="0" smtClean="0"/>
-              <a:t>  - Uppercase letters</a:t>
-            </a:r>
-          </a:p>
-          <a:p>
-            <a:r>
-              <a:rPr lang="en-US" baseline="0" dirty="0" smtClean="0"/>
-              <a:t>  - Lowercase letters</a:t>
-            </a:r>
-          </a:p>
-          <a:p>
-            <a:r>
-              <a:rPr lang="en-US" baseline="0" dirty="0" smtClean="0"/>
-              <a:t>  - Numbers</a:t>
-            </a:r>
-          </a:p>
-          <a:p>
-            <a:r>
-              <a:rPr lang="en-US" baseline="0" dirty="0" smtClean="0"/>
-              <a:t>  - Special characters</a:t>
+              <a:t> sit back and let Windows Server install. After some restarts you will be prompted to change the local Administrator’s password</a:t>
             </a:r>
             <a:endParaRPr lang="en-US" dirty="0"/>
           </a:p>
@@ -1387,7 +1475,7 @@
           <a:p>
             <a:fld id="{D7549FFE-5A44-40D1-8EEA-4FC61FBFF1FE}" type="slidenum">
               <a:rPr lang="en-US" smtClean="0"/>
-              <a:t>16</a:t>
+              <a:t>15</a:t>
             </a:fld>
             <a:endParaRPr lang="en-US"/>
           </a:p>
@@ -1396,7 +1484,7 @@
     </p:spTree>
     <p:extLst>
       <p:ext uri="{BB962C8B-B14F-4D97-AF65-F5344CB8AC3E}">
-        <p14:creationId xmlns:p14="http://schemas.microsoft.com/office/powerpoint/2010/main" val="2220607411"/>
+        <p14:creationId xmlns:p14="http://schemas.microsoft.com/office/powerpoint/2010/main" val="4182640726"/>
       </p:ext>
     </p:extLst>
   </p:cSld>

</xml_diff>